<commit_message>
fixed MS on Address
</commit_message>
<xml_diff>
--- a/pages/Figures.pptx
+++ b/pages/Figures.pptx
@@ -11,7 +11,6 @@
     <p:sldId id="1249" r:id="rId5"/>
     <p:sldId id="1244" r:id="rId6"/>
     <p:sldId id="1250" r:id="rId7"/>
-    <p:sldId id="1251" r:id="rId8"/>
   </p:sldIdLst>
   <p:sldSz cx="12192000" cy="6858000"/>
   <p:notesSz cx="6858000" cy="9144000"/>
@@ -265,7 +264,7 @@
           <a:p>
             <a:fld id="{6D5FDB8C-4C92-0C4C-BA60-9D07FDD2BD7F}" type="datetimeFigureOut">
               <a:rPr lang="en-US" smtClean="0"/>
-              <a:t>8/7/19</a:t>
+              <a:t>8/19/19</a:t>
             </a:fld>
             <a:endParaRPr lang="en-US"/>
           </a:p>
@@ -463,7 +462,7 @@
           <a:p>
             <a:fld id="{6D5FDB8C-4C92-0C4C-BA60-9D07FDD2BD7F}" type="datetimeFigureOut">
               <a:rPr lang="en-US" smtClean="0"/>
-              <a:t>8/7/19</a:t>
+              <a:t>8/19/19</a:t>
             </a:fld>
             <a:endParaRPr lang="en-US"/>
           </a:p>
@@ -671,7 +670,7 @@
           <a:p>
             <a:fld id="{6D5FDB8C-4C92-0C4C-BA60-9D07FDD2BD7F}" type="datetimeFigureOut">
               <a:rPr lang="en-US" smtClean="0"/>
-              <a:t>8/7/19</a:t>
+              <a:t>8/19/19</a:t>
             </a:fld>
             <a:endParaRPr lang="en-US"/>
           </a:p>
@@ -869,7 +868,7 @@
           <a:p>
             <a:fld id="{6D5FDB8C-4C92-0C4C-BA60-9D07FDD2BD7F}" type="datetimeFigureOut">
               <a:rPr lang="en-US" smtClean="0"/>
-              <a:t>8/7/19</a:t>
+              <a:t>8/19/19</a:t>
             </a:fld>
             <a:endParaRPr lang="en-US"/>
           </a:p>
@@ -1144,7 +1143,7 @@
           <a:p>
             <a:fld id="{6D5FDB8C-4C92-0C4C-BA60-9D07FDD2BD7F}" type="datetimeFigureOut">
               <a:rPr lang="en-US" smtClean="0"/>
-              <a:t>8/7/19</a:t>
+              <a:t>8/19/19</a:t>
             </a:fld>
             <a:endParaRPr lang="en-US"/>
           </a:p>
@@ -1409,7 +1408,7 @@
           <a:p>
             <a:fld id="{6D5FDB8C-4C92-0C4C-BA60-9D07FDD2BD7F}" type="datetimeFigureOut">
               <a:rPr lang="en-US" smtClean="0"/>
-              <a:t>8/7/19</a:t>
+              <a:t>8/19/19</a:t>
             </a:fld>
             <a:endParaRPr lang="en-US"/>
           </a:p>
@@ -1821,7 +1820,7 @@
           <a:p>
             <a:fld id="{6D5FDB8C-4C92-0C4C-BA60-9D07FDD2BD7F}" type="datetimeFigureOut">
               <a:rPr lang="en-US" smtClean="0"/>
-              <a:t>8/7/19</a:t>
+              <a:t>8/19/19</a:t>
             </a:fld>
             <a:endParaRPr lang="en-US"/>
           </a:p>
@@ -1962,7 +1961,7 @@
           <a:p>
             <a:fld id="{6D5FDB8C-4C92-0C4C-BA60-9D07FDD2BD7F}" type="datetimeFigureOut">
               <a:rPr lang="en-US" smtClean="0"/>
-              <a:t>8/7/19</a:t>
+              <a:t>8/19/19</a:t>
             </a:fld>
             <a:endParaRPr lang="en-US"/>
           </a:p>
@@ -2075,7 +2074,7 @@
           <a:p>
             <a:fld id="{6D5FDB8C-4C92-0C4C-BA60-9D07FDD2BD7F}" type="datetimeFigureOut">
               <a:rPr lang="en-US" smtClean="0"/>
-              <a:t>8/7/19</a:t>
+              <a:t>8/19/19</a:t>
             </a:fld>
             <a:endParaRPr lang="en-US"/>
           </a:p>
@@ -2386,7 +2385,7 @@
           <a:p>
             <a:fld id="{6D5FDB8C-4C92-0C4C-BA60-9D07FDD2BD7F}" type="datetimeFigureOut">
               <a:rPr lang="en-US" smtClean="0"/>
-              <a:t>8/7/19</a:t>
+              <a:t>8/19/19</a:t>
             </a:fld>
             <a:endParaRPr lang="en-US"/>
           </a:p>
@@ -2674,7 +2673,7 @@
           <a:p>
             <a:fld id="{6D5FDB8C-4C92-0C4C-BA60-9D07FDD2BD7F}" type="datetimeFigureOut">
               <a:rPr lang="en-US" smtClean="0"/>
-              <a:t>8/7/19</a:t>
+              <a:t>8/19/19</a:t>
             </a:fld>
             <a:endParaRPr lang="en-US"/>
           </a:p>
@@ -2915,7 +2914,7 @@
           <a:p>
             <a:fld id="{6D5FDB8C-4C92-0C4C-BA60-9D07FDD2BD7F}" type="datetimeFigureOut">
               <a:rPr lang="en-US" smtClean="0"/>
-              <a:t>8/7/19</a:t>
+              <a:t>8/19/19</a:t>
             </a:fld>
             <a:endParaRPr lang="en-US"/>
           </a:p>
@@ -3378,7 +3377,7 @@
         </p:nvSpPr>
         <p:spPr>
           <a:xfrm>
-            <a:off x="5009882" y="1538346"/>
+            <a:off x="2882908" y="206503"/>
             <a:ext cx="1700458" cy="646546"/>
           </a:xfrm>
           <a:prstGeom prst="roundRect">
@@ -3429,7 +3428,7 @@
         </p:nvSpPr>
         <p:spPr>
           <a:xfrm>
-            <a:off x="5200540" y="3157044"/>
+            <a:off x="3073566" y="1825201"/>
             <a:ext cx="1344349" cy="646546"/>
           </a:xfrm>
           <a:prstGeom prst="roundRect">
@@ -3480,7 +3479,7 @@
         </p:nvSpPr>
         <p:spPr>
           <a:xfrm>
-            <a:off x="2439252" y="4441591"/>
+            <a:off x="312278" y="3109748"/>
             <a:ext cx="1344349" cy="646546"/>
           </a:xfrm>
           <a:prstGeom prst="roundRect">
@@ -3533,7 +3532,7 @@
         </p:nvCxnSpPr>
         <p:spPr>
           <a:xfrm>
-            <a:off x="5860110" y="3825214"/>
+            <a:off x="3733136" y="2493371"/>
             <a:ext cx="0" cy="599493"/>
           </a:xfrm>
           <a:prstGeom prst="straightConnector1">
@@ -3571,7 +3570,7 @@
         </p:nvCxnSpPr>
         <p:spPr>
           <a:xfrm flipH="1">
-            <a:off x="3783601" y="3480317"/>
+            <a:off x="1656627" y="2148474"/>
             <a:ext cx="1416939" cy="1284547"/>
           </a:xfrm>
           <a:prstGeom prst="straightConnector1">
@@ -3608,7 +3607,7 @@
         </p:nvCxnSpPr>
         <p:spPr>
           <a:xfrm flipH="1" flipV="1">
-            <a:off x="5860112" y="2184892"/>
+            <a:off x="3733138" y="853049"/>
             <a:ext cx="12603" cy="972152"/>
           </a:xfrm>
           <a:prstGeom prst="straightConnector1">
@@ -3642,7 +3641,7 @@
         </p:nvSpPr>
         <p:spPr>
           <a:xfrm>
-            <a:off x="7697395" y="3178668"/>
+            <a:off x="5570421" y="1846825"/>
             <a:ext cx="1326335" cy="646546"/>
           </a:xfrm>
           <a:prstGeom prst="roundRect">
@@ -3702,7 +3701,7 @@
         </p:nvCxnSpPr>
         <p:spPr>
           <a:xfrm>
-            <a:off x="6544889" y="3480317"/>
+            <a:off x="4417915" y="2148474"/>
             <a:ext cx="1152506" cy="21624"/>
           </a:xfrm>
           <a:prstGeom prst="straightConnector1">
@@ -3736,7 +3735,7 @@
         </p:nvSpPr>
         <p:spPr>
           <a:xfrm>
-            <a:off x="5127675" y="4441591"/>
+            <a:off x="3000701" y="3109748"/>
             <a:ext cx="1700458" cy="646546"/>
           </a:xfrm>
           <a:prstGeom prst="roundRect">
@@ -3781,10 +3780,10 @@
       </p:sp>
       <p:sp>
         <p:nvSpPr>
-          <p:cNvPr id="7" name="TextBox 6">
-            <a:extLst>
-              <a:ext uri="{FF2B5EF4-FFF2-40B4-BE49-F238E27FC236}">
-                <a16:creationId xmlns:a16="http://schemas.microsoft.com/office/drawing/2014/main" id="{10E83AAA-9A3E-47F3-AE92-BFFF0EF38F6F}"/>
+          <p:cNvPr id="21" name="TextBox 20">
+            <a:extLst>
+              <a:ext uri="{FF2B5EF4-FFF2-40B4-BE49-F238E27FC236}">
+                <a16:creationId xmlns:a16="http://schemas.microsoft.com/office/drawing/2014/main" id="{6A56605E-8AC2-A44D-8BCF-F459E82C954D}"/>
               </a:ext>
             </a:extLst>
           </p:cNvPr>
@@ -3793,63 +3792,7 @@
         </p:nvSpPr>
         <p:spPr>
           <a:xfrm>
-            <a:off x="1519686" y="5270515"/>
-            <a:ext cx="9152628" cy="1200329"/>
-          </a:xfrm>
-          <a:prstGeom prst="rect">
-            <a:avLst/>
-          </a:prstGeom>
-          <a:noFill/>
-        </p:spPr>
-        <p:txBody>
-          <a:bodyPr wrap="square" rtlCol="0">
-            <a:spAutoFit/>
-          </a:bodyPr>
-          <a:lstStyle/>
-          <a:p>
-            <a:pPr marL="342900" indent="-342900">
-              <a:buFont typeface="Arial" panose="020B0604020202020204" pitchFamily="34" charset="0"/>
-              <a:buChar char="•"/>
-            </a:pPr>
-            <a:r>
-              <a:rPr lang="en-US" dirty="0" err="1"/>
-              <a:t>OrganizationAffiliation</a:t>
-            </a:r>
-            <a:r>
-              <a:rPr lang="en-US" dirty="0"/>
-              <a:t> -- represents non-hierarchical relationships between organizations</a:t>
-            </a:r>
-          </a:p>
-          <a:p>
-            <a:pPr marL="800100" lvl="1" indent="-342900">
-              <a:buFont typeface="Arial" panose="020B0604020202020204" pitchFamily="34" charset="0"/>
-              <a:buChar char="•"/>
-            </a:pPr>
-            <a:r>
-              <a:rPr lang="en-US" dirty="0"/>
-              <a:t>E.g. one organization providing services to another, membership in a national organization, joint venture between multiple organizations</a:t>
-            </a:r>
-          </a:p>
-          <a:p>
-            <a:endParaRPr lang="en-US" dirty="0"/>
-          </a:p>
-        </p:txBody>
-      </p:sp>
-      <p:sp>
-        <p:nvSpPr>
-          <p:cNvPr id="21" name="TextBox 20">
-            <a:extLst>
-              <a:ext uri="{FF2B5EF4-FFF2-40B4-BE49-F238E27FC236}">
-                <a16:creationId xmlns:a16="http://schemas.microsoft.com/office/drawing/2014/main" id="{6A56605E-8AC2-A44D-8BCF-F459E82C954D}"/>
-              </a:ext>
-            </a:extLst>
-          </p:cNvPr>
-          <p:cNvSpPr txBox="1"/>
-          <p:nvPr/>
-        </p:nvSpPr>
-        <p:spPr>
-          <a:xfrm>
-            <a:off x="5860111" y="2414006"/>
+            <a:off x="3733137" y="1082163"/>
             <a:ext cx="2108847" cy="369332"/>
           </a:xfrm>
           <a:prstGeom prst="rect">
@@ -3885,7 +3828,7 @@
         </p:nvSpPr>
         <p:spPr>
           <a:xfrm>
-            <a:off x="5202327" y="2473929"/>
+            <a:off x="3075353" y="1142086"/>
             <a:ext cx="657783" cy="307777"/>
           </a:xfrm>
           <a:prstGeom prst="rect">
@@ -3925,7 +3868,7 @@
         </p:nvSpPr>
         <p:spPr>
           <a:xfrm>
-            <a:off x="5872715" y="3886319"/>
+            <a:off x="3745741" y="2554476"/>
             <a:ext cx="2557623" cy="369332"/>
           </a:xfrm>
           <a:prstGeom prst="rect">
@@ -3961,7 +3904,7 @@
         </p:nvSpPr>
         <p:spPr>
           <a:xfrm>
-            <a:off x="5214931" y="3946242"/>
+            <a:off x="3087957" y="2614399"/>
             <a:ext cx="657783" cy="307777"/>
           </a:xfrm>
           <a:prstGeom prst="rect">
@@ -4001,7 +3944,7 @@
         </p:nvSpPr>
         <p:spPr>
           <a:xfrm>
-            <a:off x="6859857" y="3178034"/>
+            <a:off x="4732883" y="1846191"/>
             <a:ext cx="657783" cy="307777"/>
           </a:xfrm>
           <a:prstGeom prst="rect">
@@ -4041,7 +3984,7 @@
         </p:nvSpPr>
         <p:spPr>
           <a:xfrm>
-            <a:off x="2392170" y="3176298"/>
+            <a:off x="265196" y="1844455"/>
             <a:ext cx="1344349" cy="646546"/>
           </a:xfrm>
           <a:prstGeom prst="roundRect">
@@ -4079,7 +4022,7 @@
                   <a:sysClr val="windowText" lastClr="000000"/>
                 </a:solidFill>
               </a:rPr>
-              <a:t>Network</a:t>
+              <a:t>Endpoint</a:t>
             </a:r>
           </a:p>
         </p:txBody>
@@ -4102,7 +4045,7 @@
         </p:nvCxnSpPr>
         <p:spPr>
           <a:xfrm flipH="1">
-            <a:off x="3736519" y="3480317"/>
+            <a:off x="1609545" y="2148474"/>
             <a:ext cx="1464021" cy="19254"/>
           </a:xfrm>
           <a:prstGeom prst="straightConnector1">
@@ -4142,7 +4085,7 @@
         </p:nvSpPr>
         <p:spPr>
           <a:xfrm>
-            <a:off x="4139638" y="3206560"/>
+            <a:off x="2012664" y="1874717"/>
             <a:ext cx="657783" cy="307777"/>
           </a:xfrm>
           <a:prstGeom prst="rect">
@@ -4182,7 +4125,7 @@
         </p:nvSpPr>
         <p:spPr>
           <a:xfrm>
-            <a:off x="4027558" y="3932410"/>
+            <a:off x="1900584" y="2600567"/>
             <a:ext cx="657783" cy="307777"/>
           </a:xfrm>
           <a:prstGeom prst="rect">
@@ -4222,7 +4165,7 @@
         </p:nvSpPr>
         <p:spPr>
           <a:xfrm>
-            <a:off x="2444641" y="1660124"/>
+            <a:off x="317667" y="328281"/>
             <a:ext cx="1344349" cy="646546"/>
           </a:xfrm>
           <a:prstGeom prst="roundRect">
@@ -4279,7 +4222,7 @@
         </p:nvSpPr>
         <p:spPr>
           <a:xfrm>
-            <a:off x="3885867" y="2581717"/>
+            <a:off x="1758893" y="1249874"/>
             <a:ext cx="657783" cy="307777"/>
           </a:xfrm>
           <a:prstGeom prst="rect">
@@ -4322,7 +4265,7 @@
         </p:nvCxnSpPr>
         <p:spPr>
           <a:xfrm flipH="1" flipV="1">
-            <a:off x="3760060" y="1996385"/>
+            <a:off x="1633086" y="664542"/>
             <a:ext cx="1440480" cy="1483932"/>
           </a:xfrm>
           <a:prstGeom prst="straightConnector1">
@@ -4392,7 +4335,7 @@
         </p:nvSpPr>
         <p:spPr>
           <a:xfrm>
-            <a:off x="4950743" y="3429000"/>
+            <a:off x="2207543" y="1749287"/>
             <a:ext cx="1326335" cy="646546"/>
           </a:xfrm>
           <a:prstGeom prst="roundRect">
@@ -4454,7 +4397,7 @@
         </p:nvSpPr>
         <p:spPr>
           <a:xfrm>
-            <a:off x="3102339" y="1913298"/>
+            <a:off x="359139" y="233585"/>
             <a:ext cx="1700458" cy="646546"/>
           </a:xfrm>
           <a:prstGeom prst="roundRect">
@@ -4522,7 +4465,7 @@
         </p:nvSpPr>
         <p:spPr>
           <a:xfrm>
-            <a:off x="6277078" y="1997184"/>
+            <a:off x="3533878" y="317471"/>
             <a:ext cx="1700458" cy="646546"/>
           </a:xfrm>
           <a:prstGeom prst="roundRect">
@@ -4590,7 +4533,7 @@
         </p:nvSpPr>
         <p:spPr>
           <a:xfrm>
-            <a:off x="4754223" y="5423169"/>
+            <a:off x="2011023" y="3743456"/>
             <a:ext cx="1700458" cy="646546"/>
           </a:xfrm>
           <a:prstGeom prst="roundRect">
@@ -4651,7 +4594,7 @@
         </p:nvCxnSpPr>
         <p:spPr>
           <a:xfrm flipH="1">
-            <a:off x="5604452" y="4075546"/>
+            <a:off x="2861252" y="2395833"/>
             <a:ext cx="9459" cy="1347623"/>
           </a:xfrm>
           <a:prstGeom prst="straightConnector1">
@@ -4693,7 +4636,7 @@
         </p:nvCxnSpPr>
         <p:spPr>
           <a:xfrm flipV="1">
-            <a:off x="5604452" y="2643730"/>
+            <a:off x="2861252" y="964017"/>
             <a:ext cx="1243609" cy="830371"/>
           </a:xfrm>
           <a:prstGeom prst="straightConnector1">
@@ -4735,7 +4678,7 @@
         </p:nvCxnSpPr>
         <p:spPr>
           <a:xfrm flipH="1" flipV="1">
-            <a:off x="4134678" y="2621180"/>
+            <a:off x="1391478" y="941467"/>
             <a:ext cx="1469774" cy="807821"/>
           </a:xfrm>
           <a:prstGeom prst="straightConnector1">
@@ -4775,7 +4718,7 @@
         </p:nvSpPr>
         <p:spPr>
           <a:xfrm>
-            <a:off x="4754223" y="2717313"/>
+            <a:off x="2011023" y="1037600"/>
             <a:ext cx="657783" cy="307777"/>
           </a:xfrm>
           <a:prstGeom prst="rect">
@@ -4815,7 +4758,7 @@
         </p:nvSpPr>
         <p:spPr>
           <a:xfrm>
-            <a:off x="5895105" y="2717312"/>
+            <a:off x="3151905" y="1037599"/>
             <a:ext cx="657783" cy="307777"/>
           </a:xfrm>
           <a:prstGeom prst="rect">
@@ -4855,7 +4798,7 @@
         </p:nvSpPr>
         <p:spPr>
           <a:xfrm>
-            <a:off x="3601236" y="2897553"/>
+            <a:off x="858036" y="1217840"/>
             <a:ext cx="1056764" cy="369332"/>
           </a:xfrm>
           <a:prstGeom prst="rect">
@@ -4891,7 +4834,7 @@
         </p:nvSpPr>
         <p:spPr>
           <a:xfrm>
-            <a:off x="4095292" y="4643915"/>
+            <a:off x="1352092" y="2964202"/>
             <a:ext cx="1463414" cy="369332"/>
           </a:xfrm>
           <a:prstGeom prst="rect">
@@ -4927,7 +4870,7 @@
         </p:nvSpPr>
         <p:spPr>
           <a:xfrm>
-            <a:off x="5705404" y="4705470"/>
+            <a:off x="2962204" y="3025757"/>
             <a:ext cx="657783" cy="307777"/>
           </a:xfrm>
           <a:prstGeom prst="rect">
@@ -4967,7 +4910,7 @@
         </p:nvSpPr>
         <p:spPr>
           <a:xfrm>
-            <a:off x="6376396" y="3100609"/>
+            <a:off x="3633196" y="1420896"/>
             <a:ext cx="1647502" cy="369332"/>
           </a:xfrm>
           <a:prstGeom prst="rect">
@@ -5033,7 +4976,7 @@
         </p:nvSpPr>
         <p:spPr>
           <a:xfrm>
-            <a:off x="4950743" y="3429000"/>
+            <a:off x="617282" y="1689652"/>
             <a:ext cx="1326335" cy="646546"/>
           </a:xfrm>
           <a:prstGeom prst="roundRect">
@@ -5105,7 +5048,7 @@
         </p:nvSpPr>
         <p:spPr>
           <a:xfrm>
-            <a:off x="4763681" y="1921664"/>
+            <a:off x="430220" y="182316"/>
             <a:ext cx="1700458" cy="646546"/>
           </a:xfrm>
           <a:prstGeom prst="roundRect">
@@ -5173,7 +5116,7 @@
         </p:nvSpPr>
         <p:spPr>
           <a:xfrm>
-            <a:off x="4754223" y="4743089"/>
+            <a:off x="420762" y="3003741"/>
             <a:ext cx="1700458" cy="646546"/>
           </a:xfrm>
           <a:prstGeom prst="roundRect">
@@ -5234,7 +5177,7 @@
         </p:nvCxnSpPr>
         <p:spPr>
           <a:xfrm flipH="1">
-            <a:off x="5604452" y="4075546"/>
+            <a:off x="1270991" y="2336198"/>
             <a:ext cx="9459" cy="667543"/>
           </a:xfrm>
           <a:prstGeom prst="straightConnector1">
@@ -5277,7 +5220,7 @@
         </p:nvCxnSpPr>
         <p:spPr>
           <a:xfrm flipV="1">
-            <a:off x="5604452" y="2568210"/>
+            <a:off x="1270991" y="828862"/>
             <a:ext cx="9458" cy="905892"/>
           </a:xfrm>
           <a:prstGeom prst="straightConnector1">
@@ -5317,7 +5260,7 @@
         </p:nvSpPr>
         <p:spPr>
           <a:xfrm>
-            <a:off x="5705085" y="2740627"/>
+            <a:off x="1371624" y="1001279"/>
             <a:ext cx="657783" cy="307777"/>
           </a:xfrm>
           <a:prstGeom prst="rect">
@@ -5357,7 +5300,7 @@
         </p:nvSpPr>
         <p:spPr>
           <a:xfrm>
-            <a:off x="5705086" y="4255429"/>
+            <a:off x="1371625" y="2516081"/>
             <a:ext cx="657783" cy="307777"/>
           </a:xfrm>
           <a:prstGeom prst="rect">
@@ -5397,7 +5340,7 @@
         </p:nvSpPr>
         <p:spPr>
           <a:xfrm>
-            <a:off x="4458206" y="2695311"/>
+            <a:off x="124745" y="955963"/>
             <a:ext cx="1246880" cy="369332"/>
           </a:xfrm>
           <a:prstGeom prst="rect">
@@ -5433,7 +5376,7 @@
         </p:nvSpPr>
         <p:spPr>
           <a:xfrm>
-            <a:off x="6930787" y="3429000"/>
+            <a:off x="2597326" y="1689652"/>
             <a:ext cx="1700458" cy="646546"/>
           </a:xfrm>
           <a:prstGeom prst="roundRect">
@@ -5493,7 +5436,7 @@
         </p:nvCxnSpPr>
         <p:spPr>
           <a:xfrm>
-            <a:off x="6298084" y="3741774"/>
+            <a:off x="1964623" y="2002426"/>
             <a:ext cx="632703" cy="10499"/>
           </a:xfrm>
           <a:prstGeom prst="straightConnector1">
@@ -5533,7 +5476,7 @@
         </p:nvSpPr>
         <p:spPr>
           <a:xfrm>
-            <a:off x="6354755" y="3433997"/>
+            <a:off x="2021294" y="1694649"/>
             <a:ext cx="657783" cy="307777"/>
           </a:xfrm>
           <a:prstGeom prst="rect">
@@ -5603,7 +5546,7 @@
         </p:nvSpPr>
         <p:spPr>
           <a:xfrm>
-            <a:off x="4950743" y="3429000"/>
+            <a:off x="865761" y="1808922"/>
             <a:ext cx="1326335" cy="646546"/>
           </a:xfrm>
           <a:prstGeom prst="roundRect">
@@ -5660,7 +5603,7 @@
         </p:nvSpPr>
         <p:spPr>
           <a:xfrm>
-            <a:off x="4763681" y="1921664"/>
+            <a:off x="678699" y="301586"/>
             <a:ext cx="1700458" cy="646546"/>
           </a:xfrm>
           <a:prstGeom prst="roundRect">
@@ -5728,7 +5671,7 @@
         </p:nvSpPr>
         <p:spPr>
           <a:xfrm>
-            <a:off x="4754223" y="4743089"/>
+            <a:off x="669241" y="3123011"/>
             <a:ext cx="1700458" cy="646546"/>
           </a:xfrm>
           <a:prstGeom prst="roundRect">
@@ -5789,7 +5732,7 @@
         </p:nvCxnSpPr>
         <p:spPr>
           <a:xfrm flipH="1">
-            <a:off x="5604452" y="4075546"/>
+            <a:off x="1519470" y="2455468"/>
             <a:ext cx="9459" cy="667543"/>
           </a:xfrm>
           <a:prstGeom prst="straightConnector1">
@@ -5832,7 +5775,7 @@
         </p:nvCxnSpPr>
         <p:spPr>
           <a:xfrm flipV="1">
-            <a:off x="5604452" y="2568210"/>
+            <a:off x="1519470" y="948132"/>
             <a:ext cx="9458" cy="905892"/>
           </a:xfrm>
           <a:prstGeom prst="straightConnector1">
@@ -5872,7 +5815,7 @@
         </p:nvSpPr>
         <p:spPr>
           <a:xfrm>
-            <a:off x="5705085" y="2740627"/>
+            <a:off x="1620103" y="1120549"/>
             <a:ext cx="657783" cy="307777"/>
           </a:xfrm>
           <a:prstGeom prst="rect">
@@ -5912,7 +5855,7 @@
         </p:nvSpPr>
         <p:spPr>
           <a:xfrm>
-            <a:off x="5705086" y="4255429"/>
+            <a:off x="1620104" y="2635351"/>
             <a:ext cx="657783" cy="307777"/>
           </a:xfrm>
           <a:prstGeom prst="rect">
@@ -5952,7 +5895,7 @@
         </p:nvSpPr>
         <p:spPr>
           <a:xfrm>
-            <a:off x="4749975" y="2697387"/>
+            <a:off x="664993" y="1077309"/>
             <a:ext cx="797013" cy="369332"/>
           </a:xfrm>
           <a:prstGeom prst="rect">
@@ -5988,7 +5931,7 @@
         </p:nvSpPr>
         <p:spPr>
           <a:xfrm>
-            <a:off x="6930787" y="3429000"/>
+            <a:off x="2845805" y="1808922"/>
             <a:ext cx="1700458" cy="646546"/>
           </a:xfrm>
           <a:prstGeom prst="roundRect">
@@ -6048,7 +5991,7 @@
         </p:nvCxnSpPr>
         <p:spPr>
           <a:xfrm>
-            <a:off x="6298084" y="3741774"/>
+            <a:off x="2213102" y="2121696"/>
             <a:ext cx="632703" cy="10499"/>
           </a:xfrm>
           <a:prstGeom prst="straightConnector1">
@@ -6088,7 +6031,7 @@
         </p:nvSpPr>
         <p:spPr>
           <a:xfrm>
-            <a:off x="6354755" y="3433997"/>
+            <a:off x="2269773" y="1813919"/>
             <a:ext cx="657783" cy="307777"/>
           </a:xfrm>
           <a:prstGeom prst="rect">
@@ -6195,7 +6138,7 @@
         </p:nvSpPr>
         <p:spPr>
           <a:xfrm>
-            <a:off x="5323928" y="3415151"/>
+            <a:off x="533267" y="2133003"/>
             <a:ext cx="1344349" cy="646546"/>
           </a:xfrm>
           <a:prstGeom prst="roundRect">
@@ -6257,7 +6200,7 @@
         </p:nvCxnSpPr>
         <p:spPr>
           <a:xfrm flipH="1" flipV="1">
-            <a:off x="5971049" y="2144161"/>
+            <a:off x="1180388" y="862013"/>
             <a:ext cx="25054" cy="1270990"/>
           </a:xfrm>
           <a:prstGeom prst="straightConnector1">
@@ -6294,7 +6237,7 @@
         </p:nvCxnSpPr>
         <p:spPr>
           <a:xfrm>
-            <a:off x="5996103" y="4061697"/>
+            <a:off x="1205442" y="2779549"/>
             <a:ext cx="0" cy="975415"/>
           </a:xfrm>
           <a:prstGeom prst="straightConnector1">
@@ -6328,7 +6271,7 @@
         </p:nvSpPr>
         <p:spPr>
           <a:xfrm>
-            <a:off x="5307881" y="1497615"/>
+            <a:off x="517220" y="215467"/>
             <a:ext cx="1326335" cy="646546"/>
           </a:xfrm>
           <a:prstGeom prst="roundRect">
@@ -6384,7 +6327,7 @@
         </p:nvSpPr>
         <p:spPr>
           <a:xfrm>
-            <a:off x="5323928" y="5037112"/>
+            <a:off x="533267" y="3754964"/>
             <a:ext cx="1344349" cy="646546"/>
           </a:xfrm>
           <a:prstGeom prst="roundRect">
@@ -6441,7 +6384,7 @@
         </p:nvSpPr>
         <p:spPr>
           <a:xfrm>
-            <a:off x="7340336" y="3523800"/>
+            <a:off x="2549675" y="2241652"/>
             <a:ext cx="1326335" cy="646546"/>
           </a:xfrm>
           <a:prstGeom prst="roundRect">
@@ -6503,7 +6446,7 @@
         </p:nvSpPr>
         <p:spPr>
           <a:xfrm>
-            <a:off x="7378184" y="4613698"/>
+            <a:off x="2587523" y="3331550"/>
             <a:ext cx="1326335" cy="646546"/>
           </a:xfrm>
           <a:prstGeom prst="roundRect">
@@ -6562,7 +6505,7 @@
         </p:nvCxnSpPr>
         <p:spPr>
           <a:xfrm>
-            <a:off x="6692396" y="3809659"/>
+            <a:off x="1901735" y="2527511"/>
             <a:ext cx="597325" cy="0"/>
           </a:xfrm>
           <a:prstGeom prst="straightConnector1">
@@ -6602,7 +6545,7 @@
         </p:nvSpPr>
         <p:spPr>
           <a:xfrm>
-            <a:off x="7319506" y="2294464"/>
+            <a:off x="2528845" y="1012316"/>
             <a:ext cx="1344349" cy="646546"/>
           </a:xfrm>
           <a:prstGeom prst="roundRect">
@@ -6662,7 +6605,7 @@
         </p:nvCxnSpPr>
         <p:spPr>
           <a:xfrm flipV="1">
-            <a:off x="6680572" y="2617737"/>
+            <a:off x="1889911" y="1335589"/>
             <a:ext cx="638934" cy="1178074"/>
           </a:xfrm>
           <a:prstGeom prst="straightConnector1">
@@ -6705,7 +6648,7 @@
         </p:nvCxnSpPr>
         <p:spPr>
           <a:xfrm>
-            <a:off x="6680573" y="3850152"/>
+            <a:off x="1889912" y="2568004"/>
             <a:ext cx="697611" cy="1086819"/>
           </a:xfrm>
           <a:prstGeom prst="straightConnector1">
@@ -6745,7 +6688,7 @@
         </p:nvSpPr>
         <p:spPr>
           <a:xfrm>
-            <a:off x="6540026" y="4399427"/>
+            <a:off x="1749365" y="3117279"/>
             <a:ext cx="657783" cy="307777"/>
           </a:xfrm>
           <a:prstGeom prst="rect">
@@ -6785,7 +6728,7 @@
         </p:nvSpPr>
         <p:spPr>
           <a:xfrm>
-            <a:off x="5463164" y="4378364"/>
+            <a:off x="672503" y="3096216"/>
             <a:ext cx="657783" cy="307777"/>
           </a:xfrm>
           <a:prstGeom prst="rect">
@@ -6825,7 +6768,7 @@
         </p:nvSpPr>
         <p:spPr>
           <a:xfrm>
-            <a:off x="6682553" y="2563396"/>
+            <a:off x="1891892" y="1281248"/>
             <a:ext cx="657783" cy="307777"/>
           </a:xfrm>
           <a:prstGeom prst="rect">
@@ -6865,7 +6808,7 @@
         </p:nvSpPr>
         <p:spPr>
           <a:xfrm>
-            <a:off x="6759521" y="3522129"/>
+            <a:off x="1968860" y="2239981"/>
             <a:ext cx="657783" cy="307777"/>
           </a:xfrm>
           <a:prstGeom prst="rect">
@@ -6905,7 +6848,7 @@
         </p:nvSpPr>
         <p:spPr>
           <a:xfrm>
-            <a:off x="5514039" y="2731251"/>
+            <a:off x="723378" y="1449103"/>
             <a:ext cx="657783" cy="307777"/>
           </a:xfrm>
           <a:prstGeom prst="rect">
@@ -6947,7 +6890,7 @@
         </p:nvCxnSpPr>
         <p:spPr>
           <a:xfrm>
-            <a:off x="7938100" y="4170346"/>
+            <a:off x="3147439" y="2888198"/>
             <a:ext cx="0" cy="443352"/>
           </a:xfrm>
           <a:prstGeom prst="straightConnector1">
@@ -6973,6 +6916,46 @@
           </a:fontRef>
         </p:style>
       </p:cxnSp>
+      <p:sp>
+        <p:nvSpPr>
+          <p:cNvPr id="20" name="Rectangle 19">
+            <a:extLst>
+              <a:ext uri="{FF2B5EF4-FFF2-40B4-BE49-F238E27FC236}">
+                <a16:creationId xmlns:a16="http://schemas.microsoft.com/office/drawing/2014/main" id="{0A243EA5-BA9C-1F44-BF72-196411D94083}"/>
+              </a:ext>
+            </a:extLst>
+          </p:cNvPr>
+          <p:cNvSpPr/>
+          <p:nvPr/>
+        </p:nvSpPr>
+        <p:spPr>
+          <a:xfrm>
+            <a:off x="3182833" y="2942327"/>
+            <a:ext cx="657783" cy="307777"/>
+          </a:xfrm>
+          <a:prstGeom prst="rect">
+            <a:avLst/>
+          </a:prstGeom>
+        </p:spPr>
+        <p:txBody>
+          <a:bodyPr wrap="square">
+            <a:spAutoFit/>
+          </a:bodyPr>
+          <a:lstStyle/>
+          <a:p>
+            <a:r>
+              <a:rPr lang="en-US" sz="1400" dirty="0">
+                <a:solidFill>
+                  <a:srgbClr val="333333"/>
+                </a:solidFill>
+                <a:latin typeface="verdana" panose="020B0604030504040204" pitchFamily="34" charset="0"/>
+              </a:rPr>
+              <a:t>1..1</a:t>
+            </a:r>
+            <a:endParaRPr lang="en-US" sz="1400" dirty="0"/>
+          </a:p>
+        </p:txBody>
+      </p:sp>
     </p:spTree>
     <p:extLst>
       <p:ext uri="{BB962C8B-B14F-4D97-AF65-F5344CB8AC3E}">
@@ -7054,7 +7037,7 @@
         </p:nvSpPr>
         <p:spPr>
           <a:xfrm>
-            <a:off x="5323928" y="3415151"/>
+            <a:off x="692293" y="2103186"/>
             <a:ext cx="1344349" cy="646546"/>
           </a:xfrm>
           <a:prstGeom prst="roundRect">
@@ -7105,7 +7088,7 @@
         </p:nvCxnSpPr>
         <p:spPr>
           <a:xfrm flipH="1" flipV="1">
-            <a:off x="5971049" y="2144161"/>
+            <a:off x="1339414" y="832196"/>
             <a:ext cx="25054" cy="1270990"/>
           </a:xfrm>
           <a:prstGeom prst="straightConnector1">
@@ -7142,7 +7125,7 @@
         </p:nvCxnSpPr>
         <p:spPr>
           <a:xfrm>
-            <a:off x="5996103" y="4061697"/>
+            <a:off x="1364468" y="2749732"/>
             <a:ext cx="0" cy="975415"/>
           </a:xfrm>
           <a:prstGeom prst="straightConnector1">
@@ -7176,7 +7159,7 @@
         </p:nvSpPr>
         <p:spPr>
           <a:xfrm>
-            <a:off x="5307881" y="1497615"/>
+            <a:off x="676246" y="185650"/>
             <a:ext cx="1326335" cy="646546"/>
           </a:xfrm>
           <a:prstGeom prst="roundRect">
@@ -7232,7 +7215,7 @@
         </p:nvSpPr>
         <p:spPr>
           <a:xfrm>
-            <a:off x="5323928" y="5037112"/>
+            <a:off x="692293" y="3725147"/>
             <a:ext cx="1344349" cy="646546"/>
           </a:xfrm>
           <a:prstGeom prst="roundRect">
@@ -7289,7 +7272,7 @@
         </p:nvSpPr>
         <p:spPr>
           <a:xfrm>
-            <a:off x="5463164" y="4378364"/>
+            <a:off x="831529" y="3066399"/>
             <a:ext cx="657783" cy="307777"/>
           </a:xfrm>
           <a:prstGeom prst="rect">
@@ -7329,7 +7312,7 @@
         </p:nvSpPr>
         <p:spPr>
           <a:xfrm>
-            <a:off x="4805898" y="3461390"/>
+            <a:off x="174263" y="2149425"/>
             <a:ext cx="657783" cy="307777"/>
           </a:xfrm>
           <a:prstGeom prst="rect">
@@ -7369,7 +7352,7 @@
         </p:nvSpPr>
         <p:spPr>
           <a:xfrm>
-            <a:off x="5514039" y="2731251"/>
+            <a:off x="882404" y="1419286"/>
             <a:ext cx="657783" cy="307777"/>
           </a:xfrm>
           <a:prstGeom prst="rect">
@@ -7409,7 +7392,7 @@
         </p:nvSpPr>
         <p:spPr>
           <a:xfrm>
-            <a:off x="6039517" y="2750808"/>
+            <a:off x="1407882" y="1438843"/>
             <a:ext cx="827192" cy="307777"/>
           </a:xfrm>
           <a:prstGeom prst="rect">
@@ -7439,126 +7422,6 @@
     <p:extLst>
       <p:ext uri="{BB962C8B-B14F-4D97-AF65-F5344CB8AC3E}">
         <p14:creationId xmlns:p14="http://schemas.microsoft.com/office/powerpoint/2010/main" val="3955916935"/>
-      </p:ext>
-    </p:extLst>
-  </p:cSld>
-  <p:clrMapOvr>
-    <a:masterClrMapping/>
-  </p:clrMapOvr>
-</p:sld>
-</file>
-
-<file path=ppt/slides/slide7.xml><?xml version="1.0" encoding="utf-8"?>
-<p:sld xmlns:a="http://schemas.openxmlformats.org/drawingml/2006/main" xmlns:r="http://schemas.openxmlformats.org/officeDocument/2006/relationships" xmlns:p="http://schemas.openxmlformats.org/presentationml/2006/main">
-  <p:cSld>
-    <p:spTree>
-      <p:nvGrpSpPr>
-        <p:cNvPr id="1" name=""/>
-        <p:cNvGrpSpPr/>
-        <p:nvPr/>
-      </p:nvGrpSpPr>
-      <p:grpSpPr>
-        <a:xfrm>
-          <a:off x="0" y="0"/>
-          <a:ext cx="0" cy="0"/>
-          <a:chOff x="0" y="0"/>
-          <a:chExt cx="0" cy="0"/>
-        </a:xfrm>
-      </p:grpSpPr>
-      <p:sp>
-        <p:nvSpPr>
-          <p:cNvPr id="4" name="Slide Number Placeholder 3"/>
-          <p:cNvSpPr>
-            <a:spLocks noGrp="1"/>
-          </p:cNvSpPr>
-          <p:nvPr>
-            <p:ph type="sldNum" sz="quarter" idx="12"/>
-          </p:nvPr>
-        </p:nvSpPr>
-        <p:spPr>
-          <a:xfrm>
-            <a:off x="8610600" y="6356350"/>
-            <a:ext cx="2743200" cy="365125"/>
-          </a:xfrm>
-        </p:spPr>
-        <p:txBody>
-          <a:bodyPr/>
-          <a:lstStyle/>
-          <a:p>
-            <a:fld id="{22FFB6AE-E1BF-994E-8E90-6BA7B36DE5DD}" type="slidenum">
-              <a:rPr lang="en-US" smtClean="0">
-                <a:solidFill>
-                  <a:srgbClr val="3C3C3B">
-                    <a:lumMod val="50000"/>
-                    <a:lumOff val="50000"/>
-                  </a:srgbClr>
-                </a:solidFill>
-              </a:rPr>
-              <a:pPr/>
-              <a:t>7</a:t>
-            </a:fld>
-            <a:endParaRPr lang="en-US" dirty="0">
-              <a:solidFill>
-                <a:srgbClr val="3C3C3B">
-                  <a:lumMod val="50000"/>
-                  <a:lumOff val="50000"/>
-                </a:srgbClr>
-              </a:solidFill>
-            </a:endParaRPr>
-          </a:p>
-        </p:txBody>
-      </p:sp>
-      <p:sp>
-        <p:nvSpPr>
-          <p:cNvPr id="8" name="Rounded Rectangle 7"/>
-          <p:cNvSpPr/>
-          <p:nvPr/>
-        </p:nvSpPr>
-        <p:spPr>
-          <a:xfrm>
-            <a:off x="5323928" y="3415151"/>
-            <a:ext cx="1344349" cy="646546"/>
-          </a:xfrm>
-          <a:prstGeom prst="roundRect">
-            <a:avLst/>
-          </a:prstGeom>
-          <a:noFill/>
-          <a:ln w="38100"/>
-        </p:spPr>
-        <p:style>
-          <a:lnRef idx="1">
-            <a:schemeClr val="accent1"/>
-          </a:lnRef>
-          <a:fillRef idx="3">
-            <a:schemeClr val="accent1"/>
-          </a:fillRef>
-          <a:effectRef idx="2">
-            <a:schemeClr val="accent1"/>
-          </a:effectRef>
-          <a:fontRef idx="minor">
-            <a:schemeClr val="lt1"/>
-          </a:fontRef>
-        </p:style>
-        <p:txBody>
-          <a:bodyPr rtlCol="0" anchor="ctr"/>
-          <a:lstStyle/>
-          <a:p>
-            <a:pPr algn="ctr"/>
-            <a:r>
-              <a:rPr lang="en-US" sz="1600" dirty="0">
-                <a:solidFill>
-                  <a:sysClr val="windowText" lastClr="000000"/>
-                </a:solidFill>
-              </a:rPr>
-              <a:t>Practitioner</a:t>
-            </a:r>
-          </a:p>
-        </p:txBody>
-      </p:sp>
-    </p:spTree>
-    <p:extLst>
-      <p:ext uri="{BB962C8B-B14F-4D97-AF65-F5344CB8AC3E}">
-        <p14:creationId xmlns:p14="http://schemas.microsoft.com/office/powerpoint/2010/main" val="4119426817"/>
       </p:ext>
     </p:extLst>
   </p:cSld>

</xml_diff>

<commit_message>
addressing numerous issues in IG and examples
</commit_message>
<xml_diff>
--- a/pages/Figures.pptx
+++ b/pages/Figures.pptx
@@ -265,7 +265,7 @@
           <a:p>
             <a:fld id="{6D5FDB8C-4C92-0C4C-BA60-9D07FDD2BD7F}" type="datetimeFigureOut">
               <a:rPr lang="en-US" smtClean="0"/>
-              <a:t>8/19/19</a:t>
+              <a:t>12/23/19</a:t>
             </a:fld>
             <a:endParaRPr lang="en-US"/>
           </a:p>
@@ -463,7 +463,7 @@
           <a:p>
             <a:fld id="{6D5FDB8C-4C92-0C4C-BA60-9D07FDD2BD7F}" type="datetimeFigureOut">
               <a:rPr lang="en-US" smtClean="0"/>
-              <a:t>8/19/19</a:t>
+              <a:t>12/23/19</a:t>
             </a:fld>
             <a:endParaRPr lang="en-US"/>
           </a:p>
@@ -671,7 +671,7 @@
           <a:p>
             <a:fld id="{6D5FDB8C-4C92-0C4C-BA60-9D07FDD2BD7F}" type="datetimeFigureOut">
               <a:rPr lang="en-US" smtClean="0"/>
-              <a:t>8/19/19</a:t>
+              <a:t>12/23/19</a:t>
             </a:fld>
             <a:endParaRPr lang="en-US"/>
           </a:p>
@@ -869,7 +869,7 @@
           <a:p>
             <a:fld id="{6D5FDB8C-4C92-0C4C-BA60-9D07FDD2BD7F}" type="datetimeFigureOut">
               <a:rPr lang="en-US" smtClean="0"/>
-              <a:t>8/19/19</a:t>
+              <a:t>12/23/19</a:t>
             </a:fld>
             <a:endParaRPr lang="en-US"/>
           </a:p>
@@ -1144,7 +1144,7 @@
           <a:p>
             <a:fld id="{6D5FDB8C-4C92-0C4C-BA60-9D07FDD2BD7F}" type="datetimeFigureOut">
               <a:rPr lang="en-US" smtClean="0"/>
-              <a:t>8/19/19</a:t>
+              <a:t>12/23/19</a:t>
             </a:fld>
             <a:endParaRPr lang="en-US"/>
           </a:p>
@@ -1409,7 +1409,7 @@
           <a:p>
             <a:fld id="{6D5FDB8C-4C92-0C4C-BA60-9D07FDD2BD7F}" type="datetimeFigureOut">
               <a:rPr lang="en-US" smtClean="0"/>
-              <a:t>8/19/19</a:t>
+              <a:t>12/23/19</a:t>
             </a:fld>
             <a:endParaRPr lang="en-US"/>
           </a:p>
@@ -1821,7 +1821,7 @@
           <a:p>
             <a:fld id="{6D5FDB8C-4C92-0C4C-BA60-9D07FDD2BD7F}" type="datetimeFigureOut">
               <a:rPr lang="en-US" smtClean="0"/>
-              <a:t>8/19/19</a:t>
+              <a:t>12/23/19</a:t>
             </a:fld>
             <a:endParaRPr lang="en-US"/>
           </a:p>
@@ -1962,7 +1962,7 @@
           <a:p>
             <a:fld id="{6D5FDB8C-4C92-0C4C-BA60-9D07FDD2BD7F}" type="datetimeFigureOut">
               <a:rPr lang="en-US" smtClean="0"/>
-              <a:t>8/19/19</a:t>
+              <a:t>12/23/19</a:t>
             </a:fld>
             <a:endParaRPr lang="en-US"/>
           </a:p>
@@ -2075,7 +2075,7 @@
           <a:p>
             <a:fld id="{6D5FDB8C-4C92-0C4C-BA60-9D07FDD2BD7F}" type="datetimeFigureOut">
               <a:rPr lang="en-US" smtClean="0"/>
-              <a:t>8/19/19</a:t>
+              <a:t>12/23/19</a:t>
             </a:fld>
             <a:endParaRPr lang="en-US"/>
           </a:p>
@@ -2386,7 +2386,7 @@
           <a:p>
             <a:fld id="{6D5FDB8C-4C92-0C4C-BA60-9D07FDD2BD7F}" type="datetimeFigureOut">
               <a:rPr lang="en-US" smtClean="0"/>
-              <a:t>8/19/19</a:t>
+              <a:t>12/23/19</a:t>
             </a:fld>
             <a:endParaRPr lang="en-US"/>
           </a:p>
@@ -2674,7 +2674,7 @@
           <a:p>
             <a:fld id="{6D5FDB8C-4C92-0C4C-BA60-9D07FDD2BD7F}" type="datetimeFigureOut">
               <a:rPr lang="en-US" smtClean="0"/>
-              <a:t>8/19/19</a:t>
+              <a:t>12/23/19</a:t>
             </a:fld>
             <a:endParaRPr lang="en-US"/>
           </a:p>
@@ -2915,7 +2915,7 @@
           <a:p>
             <a:fld id="{6D5FDB8C-4C92-0C4C-BA60-9D07FDD2BD7F}" type="datetimeFigureOut">
               <a:rPr lang="en-US" smtClean="0"/>
-              <a:t>8/19/19</a:t>
+              <a:t>12/23/19</a:t>
             </a:fld>
             <a:endParaRPr lang="en-US"/>
           </a:p>
@@ -6951,7 +6951,7 @@
                 </a:solidFill>
                 <a:latin typeface="verdana" panose="020B0604030504040204" pitchFamily="34" charset="0"/>
               </a:rPr>
-              <a:t>1..1</a:t>
+              <a:t>0..1</a:t>
             </a:r>
             <a:endParaRPr lang="en-US" sz="1400" dirty="0"/>
           </a:p>

</xml_diff>